<commit_message>
update slides for P3087
</commit_message>
<xml_diff>
--- a/slides/p3087-slides.pptx
+++ b/slides/p3087-slides.pptx
@@ -5,7 +5,7 @@
     <p:sldMasterId id="2147483648" r:id="rId1"/>
   </p:sldMasterIdLst>
   <p:notesMasterIdLst>
-    <p:notesMasterId r:id="rId9"/>
+    <p:notesMasterId r:id="rId10"/>
   </p:notesMasterIdLst>
   <p:sldIdLst>
     <p:sldId id="256" r:id="rId2"/>
@@ -14,7 +14,8 @@
     <p:sldId id="259" r:id="rId5"/>
     <p:sldId id="262" r:id="rId6"/>
     <p:sldId id="263" r:id="rId7"/>
-    <p:sldId id="264" r:id="rId8"/>
+    <p:sldId id="265" r:id="rId8"/>
+    <p:sldId id="264" r:id="rId9"/>
   </p:sldIdLst>
   <p:sldSz cx="12192000" cy="6858000"/>
   <p:notesSz cx="6858000" cy="9144000"/>
@@ -203,7 +204,7 @@
           <a:p>
             <a:fld id="{CD962821-9FDB-4417-B8B3-21108CBE3224}" type="datetimeFigureOut">
               <a:rPr lang="en-DE" smtClean="0"/>
-              <a:t>03/20/2024</a:t>
+              <a:t>29/05/2024</a:t>
             </a:fld>
             <a:endParaRPr lang="en-DE"/>
           </a:p>
@@ -620,7 +621,7 @@
           <a:p>
             <a:fld id="{71B2745E-CC1F-4D8C-AB14-713BDEDCFEEB}" type="datetime8">
               <a:rPr lang="en-DE" smtClean="0"/>
-              <a:t>03/20/2024 19:33</a:t>
+              <a:t>29/05/2024 16:18</a:t>
             </a:fld>
             <a:endParaRPr lang="en-DE"/>
           </a:p>
@@ -820,7 +821,7 @@
           <a:p>
             <a:fld id="{5CFB80E4-33E7-4BD8-A1D1-C1E453B36FBE}" type="datetime8">
               <a:rPr lang="en-DE" smtClean="0"/>
-              <a:t>03/20/2024 19:33</a:t>
+              <a:t>29/05/2024 16:18</a:t>
             </a:fld>
             <a:endParaRPr lang="en-DE"/>
           </a:p>
@@ -1030,7 +1031,7 @@
           <a:p>
             <a:fld id="{35606A28-1F59-4FFB-92CF-CE623345F9DB}" type="datetime8">
               <a:rPr lang="en-DE" smtClean="0"/>
-              <a:t>03/20/2024 19:33</a:t>
+              <a:t>29/05/2024 16:18</a:t>
             </a:fld>
             <a:endParaRPr lang="en-DE"/>
           </a:p>
@@ -1230,7 +1231,7 @@
           <a:p>
             <a:fld id="{0EB0A135-D190-4BD9-B150-64BA07FEF37B}" type="datetime8">
               <a:rPr lang="en-DE" smtClean="0"/>
-              <a:t>03/20/2024 19:33</a:t>
+              <a:t>29/05/2024 16:18</a:t>
             </a:fld>
             <a:endParaRPr lang="en-DE"/>
           </a:p>
@@ -1506,7 +1507,7 @@
           <a:p>
             <a:fld id="{75EECE1D-6A5B-488C-96F4-3F018FB6CB1F}" type="datetime8">
               <a:rPr lang="en-DE" smtClean="0"/>
-              <a:t>03/20/2024 19:33</a:t>
+              <a:t>29/05/2024 16:18</a:t>
             </a:fld>
             <a:endParaRPr lang="en-DE"/>
           </a:p>
@@ -1774,7 +1775,7 @@
           <a:p>
             <a:fld id="{E994E17E-FE36-4AAC-B6F4-3A0FEB106346}" type="datetime8">
               <a:rPr lang="en-DE" smtClean="0"/>
-              <a:t>03/20/2024 19:33</a:t>
+              <a:t>29/05/2024 16:18</a:t>
             </a:fld>
             <a:endParaRPr lang="en-DE"/>
           </a:p>
@@ -2189,7 +2190,7 @@
           <a:p>
             <a:fld id="{A1274BE2-97CD-40A0-B6BF-437A9B3728FF}" type="datetime8">
               <a:rPr lang="en-DE" smtClean="0"/>
-              <a:t>03/20/2024 19:33</a:t>
+              <a:t>29/05/2024 16:18</a:t>
             </a:fld>
             <a:endParaRPr lang="en-DE"/>
           </a:p>
@@ -2331,7 +2332,7 @@
           <a:p>
             <a:fld id="{BED03E48-4668-48E3-8E08-D6EF6EFD458C}" type="datetime8">
               <a:rPr lang="en-DE" smtClean="0"/>
-              <a:t>03/20/2024 19:33</a:t>
+              <a:t>29/05/2024 16:18</a:t>
             </a:fld>
             <a:endParaRPr lang="en-DE"/>
           </a:p>
@@ -2444,7 +2445,7 @@
           <a:p>
             <a:fld id="{C01F1FF6-23CE-41F2-98FA-82F1523C33FE}" type="datetime8">
               <a:rPr lang="en-DE" smtClean="0"/>
-              <a:t>03/20/2024 19:33</a:t>
+              <a:t>29/05/2024 16:18</a:t>
             </a:fld>
             <a:endParaRPr lang="en-DE"/>
           </a:p>
@@ -2757,7 +2758,7 @@
           <a:p>
             <a:fld id="{DE10CF8B-005B-45A0-8527-E3C8A79F5D7D}" type="datetime8">
               <a:rPr lang="en-DE" smtClean="0"/>
-              <a:t>03/20/2024 19:33</a:t>
+              <a:t>29/05/2024 16:18</a:t>
             </a:fld>
             <a:endParaRPr lang="en-DE"/>
           </a:p>
@@ -3046,7 +3047,7 @@
           <a:p>
             <a:fld id="{05D82414-ECD0-4D1E-890D-FA17C5DB1788}" type="datetime8">
               <a:rPr lang="en-DE" smtClean="0"/>
-              <a:t>03/20/2024 19:33</a:t>
+              <a:t>29/05/2024 16:18</a:t>
             </a:fld>
             <a:endParaRPr lang="en-DE"/>
           </a:p>
@@ -3289,7 +3290,7 @@
           <a:p>
             <a:fld id="{2434BD09-B586-496D-A7C7-4A6458ECB1EF}" type="datetime8">
               <a:rPr lang="en-DE" smtClean="0"/>
-              <a:t>03/20/2024 19:33</a:t>
+              <a:t>29/05/2024 16:18</a:t>
             </a:fld>
             <a:endParaRPr lang="en-DE"/>
           </a:p>
@@ -3901,7 +3902,7 @@
                   </a:schemeClr>
                 </a:solidFill>
               </a:rPr>
-              <a:t>P3087</a:t>
+              <a:t>P3087R1</a:t>
             </a:r>
             <a:endParaRPr lang="de-DE" sz="4800" b="1">
               <a:solidFill>
@@ -4073,7 +4074,7 @@
             </a:r>
             <a:r>
               <a:rPr lang="de-DE"/>
-              <a:t>:    SG17</a:t>
+              <a:t>:    EWG</a:t>
             </a:r>
           </a:p>
           <a:p>
@@ -5192,15 +5193,25 @@
                   <a:srgbClr val="FF0066"/>
                 </a:solidFill>
               </a:rPr>
-              <a:t>P0138R2</a:t>
+              <a:t>P0138R2:</a:t>
             </a:r>
             <a:r>
               <a:rPr lang="de-DE" sz="2400"/>
-              <a:t>: </a:t>
+              <a:t> </a:t>
             </a:r>
             <a:r>
               <a:rPr lang="en-US" sz="2400"/>
-              <a:t>Construction Rules for enum class Values</a:t>
+              <a:t>Construction Rules for </a:t>
+            </a:r>
+            <a:r>
+              <a:rPr lang="en-US" sz="2000">
+                <a:latin typeface="Aptos Mono" panose="020B0009020202020204" pitchFamily="49" charset="0"/>
+              </a:rPr>
+              <a:t>enum class</a:t>
+            </a:r>
+            <a:r>
+              <a:rPr lang="en-US" sz="2400"/>
+              <a:t> Values</a:t>
             </a:r>
             <a:r>
               <a:rPr lang="de-DE" sz="2400"/>
@@ -7327,7 +7338,7 @@
           <a:p>
             <a:r>
               <a:rPr lang="de-DE" sz="2200" i="1"/>
-              <a:t>TODO: Feature-detection macro?</a:t>
+              <a:t>TODO: Feature-detection macro? (Topic for SG10/CWG)</a:t>
             </a:r>
           </a:p>
         </p:txBody>
@@ -8021,7 +8032,7 @@
             </a:pPr>
             <a:r>
               <a:rPr lang="de-DE" sz="3600" b="1"/>
-              <a:t>Dubious side effect</a:t>
+              <a:t>Aggressive permissiveness</a:t>
             </a:r>
           </a:p>
           <a:p>
@@ -8591,6 +8602,1176 @@
                 </a:solidFill>
               </a:rPr>
               <a:t>6</a:t>
+            </a:fld>
+            <a:endParaRPr lang="en-DE" sz="2800" b="1">
+              <a:solidFill>
+                <a:schemeClr val="bg1"/>
+              </a:solidFill>
+            </a:endParaRPr>
+          </a:p>
+        </p:txBody>
+      </p:sp>
+      <p:sp>
+        <p:nvSpPr>
+          <p:cNvPr id="12" name="Textfeld 11">
+            <a:extLst>
+              <a:ext uri="{FF2B5EF4-FFF2-40B4-BE49-F238E27FC236}">
+                <a16:creationId xmlns:a16="http://schemas.microsoft.com/office/drawing/2014/main" id="{DE687096-3384-3D10-D13A-F84118487586}"/>
+              </a:ext>
+            </a:extLst>
+          </p:cNvPr>
+          <p:cNvSpPr txBox="1"/>
+          <p:nvPr/>
+        </p:nvSpPr>
+        <p:spPr>
+          <a:xfrm>
+            <a:off x="296006" y="10432"/>
+            <a:ext cx="10554087" cy="830997"/>
+          </a:xfrm>
+          <a:prstGeom prst="rect">
+            <a:avLst/>
+          </a:prstGeom>
+          <a:noFill/>
+        </p:spPr>
+        <p:txBody>
+          <a:bodyPr wrap="square" rtlCol="0">
+            <a:spAutoFit/>
+          </a:bodyPr>
+          <a:lstStyle/>
+          <a:p>
+            <a:r>
+              <a:rPr lang="de-DE" sz="4800" b="1"/>
+              <a:t>4. Design - Alternatives</a:t>
+            </a:r>
+            <a:endParaRPr lang="en-DE" sz="4800" b="1"/>
+          </a:p>
+        </p:txBody>
+      </p:sp>
+      <p:sp>
+        <p:nvSpPr>
+          <p:cNvPr id="14" name="Textfeld 13">
+            <a:extLst>
+              <a:ext uri="{FF2B5EF4-FFF2-40B4-BE49-F238E27FC236}">
+                <a16:creationId xmlns:a16="http://schemas.microsoft.com/office/drawing/2014/main" id="{628D3CBC-1457-29F8-565B-1BF68746439C}"/>
+              </a:ext>
+            </a:extLst>
+          </p:cNvPr>
+          <p:cNvSpPr txBox="1"/>
+          <p:nvPr/>
+        </p:nvSpPr>
+        <p:spPr>
+          <a:xfrm>
+            <a:off x="312561" y="1073457"/>
+            <a:ext cx="10676794" cy="4893647"/>
+          </a:xfrm>
+          <a:prstGeom prst="rect">
+            <a:avLst/>
+          </a:prstGeom>
+          <a:noFill/>
+        </p:spPr>
+        <p:txBody>
+          <a:bodyPr wrap="square" rtlCol="0">
+            <a:spAutoFit/>
+          </a:bodyPr>
+          <a:lstStyle/>
+          <a:p>
+            <a:r>
+              <a:rPr lang="de-DE" sz="3600" b="1"/>
+              <a:t>Comparison</a:t>
+            </a:r>
+          </a:p>
+          <a:p>
+            <a:endParaRPr lang="de-DE" sz="3600"/>
+          </a:p>
+          <a:p>
+            <a:endParaRPr lang="de-DE" sz="3600"/>
+          </a:p>
+          <a:p>
+            <a:endParaRPr lang="de-DE" sz="3600"/>
+          </a:p>
+          <a:p>
+            <a:endParaRPr lang="de-DE" sz="3600"/>
+          </a:p>
+          <a:p>
+            <a:endParaRPr lang="de-DE" sz="3600"/>
+          </a:p>
+          <a:p>
+            <a:pPr marL="342900" indent="-342900">
+              <a:buFont typeface="Arial" panose="020B0604020202020204" pitchFamily="34" charset="0"/>
+              <a:buChar char="•"/>
+            </a:pPr>
+            <a:r>
+              <a:rPr lang="de-DE" sz="2400"/>
+              <a:t>Only proposed design is consistent with non-list-direct-initialization at large</a:t>
+            </a:r>
+          </a:p>
+          <a:p>
+            <a:pPr marL="342900" indent="-342900">
+              <a:buFont typeface="Arial" panose="020B0604020202020204" pitchFamily="34" charset="0"/>
+              <a:buChar char="•"/>
+            </a:pPr>
+            <a:r>
+              <a:rPr lang="de-DE" sz="2400"/>
+              <a:t>Only proposed design is symmetrical with explicit constructors</a:t>
+            </a:r>
+          </a:p>
+          <a:p>
+            <a:pPr marL="342900" indent="-342900">
+              <a:buFont typeface="Arial" panose="020B0604020202020204" pitchFamily="34" charset="0"/>
+              <a:buChar char="•"/>
+            </a:pPr>
+            <a:r>
+              <a:rPr lang="de-DE" sz="2400"/>
+              <a:t>More restrictive semantics can be achieved with warnings (QoI)</a:t>
+            </a:r>
+          </a:p>
+          <a:p>
+            <a:pPr marL="342900" indent="-342900">
+              <a:buFont typeface="Arial" panose="020B0604020202020204" pitchFamily="34" charset="0"/>
+              <a:buChar char="•"/>
+            </a:pPr>
+            <a:endParaRPr lang="de-DE" sz="2400"/>
+          </a:p>
+        </p:txBody>
+      </p:sp>
+      <p:pic>
+        <p:nvPicPr>
+          <p:cNvPr id="3" name="Graphic 2">
+            <a:extLst>
+              <a:ext uri="{FF2B5EF4-FFF2-40B4-BE49-F238E27FC236}">
+                <a16:creationId xmlns:a16="http://schemas.microsoft.com/office/drawing/2014/main" id="{DBDFCB48-6DA9-4924-8392-60BB20D46DA8}"/>
+              </a:ext>
+            </a:extLst>
+          </p:cNvPr>
+          <p:cNvPicPr>
+            <a:picLocks noChangeAspect="1"/>
+          </p:cNvPicPr>
+          <p:nvPr/>
+        </p:nvPicPr>
+        <p:blipFill>
+          <a:blip r:embed="rId2">
+            <a:extLst>
+              <a:ext uri="{28A0092B-C50C-407E-A947-70E740481C1C}">
+                <a14:useLocalDpi xmlns:a14="http://schemas.microsoft.com/office/drawing/2010/main" val="0"/>
+              </a:ext>
+              <a:ext uri="{96DAC541-7B7A-43D3-8B79-37D633B846F1}">
+                <asvg:svgBlip xmlns:asvg="http://schemas.microsoft.com/office/drawing/2016/SVG/main" r:embed="rId3"/>
+              </a:ext>
+            </a:extLst>
+          </a:blip>
+          <a:stretch>
+            <a:fillRect/>
+          </a:stretch>
+        </p:blipFill>
+        <p:spPr>
+          <a:xfrm>
+            <a:off x="10989355" y="5195799"/>
+            <a:ext cx="1048303" cy="1048303"/>
+          </a:xfrm>
+          <a:prstGeom prst="rect">
+            <a:avLst/>
+          </a:prstGeom>
+        </p:spPr>
+      </p:pic>
+      <p:sp>
+        <p:nvSpPr>
+          <p:cNvPr id="2" name="Textfeld 14">
+            <a:extLst>
+              <a:ext uri="{FF2B5EF4-FFF2-40B4-BE49-F238E27FC236}">
+                <a16:creationId xmlns:a16="http://schemas.microsoft.com/office/drawing/2014/main" id="{96791CAB-E0E5-DF12-6756-0E5C30C6CC64}"/>
+              </a:ext>
+            </a:extLst>
+          </p:cNvPr>
+          <p:cNvSpPr txBox="1"/>
+          <p:nvPr/>
+        </p:nvSpPr>
+        <p:spPr>
+          <a:xfrm>
+            <a:off x="1336431" y="6211669"/>
+            <a:ext cx="8767796" cy="646331"/>
+          </a:xfrm>
+          <a:prstGeom prst="rect">
+            <a:avLst/>
+          </a:prstGeom>
+          <a:noFill/>
+        </p:spPr>
+        <p:txBody>
+          <a:bodyPr wrap="square" rtlCol="0">
+            <a:spAutoFit/>
+          </a:bodyPr>
+          <a:lstStyle/>
+          <a:p>
+            <a:pPr algn="ctr"/>
+            <a:r>
+              <a:rPr lang="de-DE" b="1">
+                <a:solidFill>
+                  <a:schemeClr val="bg1">
+                    <a:lumMod val="85000"/>
+                  </a:schemeClr>
+                </a:solidFill>
+              </a:rPr>
+              <a:t>P3087 </a:t>
+            </a:r>
+          </a:p>
+          <a:p>
+            <a:pPr algn="ctr"/>
+            <a:r>
+              <a:rPr lang="de-DE">
+                <a:solidFill>
+                  <a:schemeClr val="bg1">
+                    <a:lumMod val="85000"/>
+                  </a:schemeClr>
+                </a:solidFill>
+              </a:rPr>
+              <a:t>Jan Schultke</a:t>
+            </a:r>
+            <a:endParaRPr lang="en-DE">
+              <a:solidFill>
+                <a:schemeClr val="bg1">
+                  <a:lumMod val="85000"/>
+                </a:schemeClr>
+              </a:solidFill>
+            </a:endParaRPr>
+          </a:p>
+        </p:txBody>
+      </p:sp>
+      <p:graphicFrame>
+        <p:nvGraphicFramePr>
+          <p:cNvPr id="9" name="Table 8">
+            <a:extLst>
+              <a:ext uri="{FF2B5EF4-FFF2-40B4-BE49-F238E27FC236}">
+                <a16:creationId xmlns:a16="http://schemas.microsoft.com/office/drawing/2014/main" id="{EAA45C0C-39C1-39E6-5495-DDEC96834229}"/>
+              </a:ext>
+            </a:extLst>
+          </p:cNvPr>
+          <p:cNvGraphicFramePr>
+            <a:graphicFrameLocks noGrp="1"/>
+          </p:cNvGraphicFramePr>
+          <p:nvPr>
+            <p:extLst>
+              <p:ext uri="{D42A27DB-BD31-4B8C-83A1-F6EECF244321}">
+                <p14:modId xmlns:p14="http://schemas.microsoft.com/office/powerpoint/2010/main" val="2001785510"/>
+              </p:ext>
+            </p:extLst>
+          </p:nvPr>
+        </p:nvGraphicFramePr>
+        <p:xfrm>
+          <a:off x="384133" y="1772870"/>
+          <a:ext cx="11078995" cy="2136400"/>
+        </p:xfrm>
+        <a:graphic>
+          <a:graphicData uri="http://schemas.openxmlformats.org/drawingml/2006/table">
+            <a:tbl>
+              <a:tblPr firstRow="1" bandRow="1">
+                <a:tableStyleId>{073A0DAA-6AF3-43AB-8588-CEC1D06C72B9}</a:tableStyleId>
+              </a:tblPr>
+              <a:tblGrid>
+                <a:gridCol w="4028476">
+                  <a:extLst>
+                    <a:ext uri="{9D8B030D-6E8A-4147-A177-3AD203B41FA5}">
+                      <a16:colId xmlns:a16="http://schemas.microsoft.com/office/drawing/2014/main" val="4031995397"/>
+                    </a:ext>
+                  </a:extLst>
+                </a:gridCol>
+                <a:gridCol w="2138680">
+                  <a:extLst>
+                    <a:ext uri="{9D8B030D-6E8A-4147-A177-3AD203B41FA5}">
+                      <a16:colId xmlns:a16="http://schemas.microsoft.com/office/drawing/2014/main" val="793872438"/>
+                    </a:ext>
+                  </a:extLst>
+                </a:gridCol>
+                <a:gridCol w="2260918">
+                  <a:extLst>
+                    <a:ext uri="{9D8B030D-6E8A-4147-A177-3AD203B41FA5}">
+                      <a16:colId xmlns:a16="http://schemas.microsoft.com/office/drawing/2014/main" val="2394951253"/>
+                    </a:ext>
+                  </a:extLst>
+                </a:gridCol>
+                <a:gridCol w="2650921">
+                  <a:extLst>
+                    <a:ext uri="{9D8B030D-6E8A-4147-A177-3AD203B41FA5}">
+                      <a16:colId xmlns:a16="http://schemas.microsoft.com/office/drawing/2014/main" val="4034010627"/>
+                    </a:ext>
+                  </a:extLst>
+                </a:gridCol>
+              </a:tblGrid>
+              <a:tr h="427280">
+                <a:tc>
+                  <a:txBody>
+                    <a:bodyPr/>
+                    <a:lstStyle/>
+                    <a:p>
+                      <a:r>
+                        <a:rPr lang="en-US"/>
+                        <a:t>Option</a:t>
+                      </a:r>
+                      <a:endParaRPr lang="en-DE"/>
+                    </a:p>
+                  </a:txBody>
+                  <a:tcPr/>
+                </a:tc>
+                <a:tc>
+                  <a:txBody>
+                    <a:bodyPr/>
+                    <a:lstStyle/>
+                    <a:p>
+                      <a:pPr algn="ctr"/>
+                      <a:r>
+                        <a:rPr lang="en-US" sz="1600">
+                          <a:latin typeface="Aptos Mono" panose="020B0009020202020204" pitchFamily="49" charset="0"/>
+                        </a:rPr>
+                        <a:t>std::byte b(</a:t>
+                      </a:r>
+                      <a:r>
+                        <a:rPr lang="en-US" sz="1600">
+                          <a:solidFill>
+                            <a:schemeClr val="accent1">
+                              <a:lumMod val="40000"/>
+                              <a:lumOff val="60000"/>
+                            </a:schemeClr>
+                          </a:solidFill>
+                          <a:latin typeface="Aptos Mono" panose="020B0009020202020204" pitchFamily="49" charset="0"/>
+                        </a:rPr>
+                        <a:t>0</a:t>
+                      </a:r>
+                      <a:r>
+                        <a:rPr lang="en-US" sz="1600">
+                          <a:latin typeface="Aptos Mono" panose="020B0009020202020204" pitchFamily="49" charset="0"/>
+                        </a:rPr>
+                        <a:t>);</a:t>
+                      </a:r>
+                      <a:endParaRPr lang="en-DE" sz="1600">
+                        <a:latin typeface="Aptos Mono" panose="020B0009020202020204" pitchFamily="49" charset="0"/>
+                      </a:endParaRPr>
+                    </a:p>
+                  </a:txBody>
+                  <a:tcPr/>
+                </a:tc>
+                <a:tc>
+                  <a:txBody>
+                    <a:bodyPr/>
+                    <a:lstStyle/>
+                    <a:p>
+                      <a:pPr marL="0" marR="0" lvl="0" indent="0" algn="ctr" defTabSz="914400" rtl="0" eaLnBrk="1" fontAlgn="auto" latinLnBrk="0" hangingPunct="1">
+                        <a:lnSpc>
+                          <a:spcPct val="100000"/>
+                        </a:lnSpc>
+                        <a:spcBef>
+                          <a:spcPts val="0"/>
+                        </a:spcBef>
+                        <a:spcAft>
+                          <a:spcPts val="0"/>
+                        </a:spcAft>
+                        <a:buClrTx/>
+                        <a:buSzTx/>
+                        <a:buFontTx/>
+                        <a:buNone/>
+                        <a:tabLst/>
+                        <a:defRPr/>
+                      </a:pPr>
+                      <a:r>
+                        <a:rPr lang="en-US" sz="1600">
+                          <a:latin typeface="Aptos Mono" panose="020B0009020202020204" pitchFamily="49" charset="0"/>
+                        </a:rPr>
+                        <a:t>std::byte b(</a:t>
+                      </a:r>
+                      <a:r>
+                        <a:rPr lang="en-US" sz="1600">
+                          <a:solidFill>
+                            <a:schemeClr val="accent1">
+                              <a:lumMod val="40000"/>
+                              <a:lumOff val="60000"/>
+                            </a:schemeClr>
+                          </a:solidFill>
+                          <a:latin typeface="Aptos Mono" panose="020B0009020202020204" pitchFamily="49" charset="0"/>
+                        </a:rPr>
+                        <a:t>-1</a:t>
+                      </a:r>
+                      <a:r>
+                        <a:rPr lang="en-US" sz="1600">
+                          <a:latin typeface="Aptos Mono" panose="020B0009020202020204" pitchFamily="49" charset="0"/>
+                        </a:rPr>
+                        <a:t>);</a:t>
+                      </a:r>
+                      <a:endParaRPr lang="en-DE" sz="1600">
+                        <a:latin typeface="Aptos Mono" panose="020B0009020202020204" pitchFamily="49" charset="0"/>
+                      </a:endParaRPr>
+                    </a:p>
+                  </a:txBody>
+                  <a:tcPr/>
+                </a:tc>
+                <a:tc>
+                  <a:txBody>
+                    <a:bodyPr/>
+                    <a:lstStyle/>
+                    <a:p>
+                      <a:pPr marL="0" marR="0" lvl="0" indent="0" algn="ctr" defTabSz="914400" rtl="0" eaLnBrk="1" fontAlgn="auto" latinLnBrk="0" hangingPunct="1">
+                        <a:lnSpc>
+                          <a:spcPct val="100000"/>
+                        </a:lnSpc>
+                        <a:spcBef>
+                          <a:spcPts val="0"/>
+                        </a:spcBef>
+                        <a:spcAft>
+                          <a:spcPts val="0"/>
+                        </a:spcAft>
+                        <a:buClrTx/>
+                        <a:buSzTx/>
+                        <a:buFontTx/>
+                        <a:buNone/>
+                        <a:tabLst/>
+                        <a:defRPr/>
+                      </a:pPr>
+                      <a:r>
+                        <a:rPr lang="en-US" sz="1600">
+                          <a:latin typeface="Aptos Mono" panose="020B0009020202020204" pitchFamily="49" charset="0"/>
+                        </a:rPr>
+                        <a:t>std::byte b(</a:t>
+                      </a:r>
+                      <a:r>
+                        <a:rPr lang="en-US" sz="1600">
+                          <a:solidFill>
+                            <a:schemeClr val="accent1">
+                              <a:lumMod val="40000"/>
+                              <a:lumOff val="60000"/>
+                            </a:schemeClr>
+                          </a:solidFill>
+                          <a:latin typeface="Aptos Mono" panose="020B0009020202020204" pitchFamily="49" charset="0"/>
+                        </a:rPr>
+                        <a:t>0.f</a:t>
+                      </a:r>
+                      <a:r>
+                        <a:rPr lang="en-US" sz="1600">
+                          <a:latin typeface="Aptos Mono" panose="020B0009020202020204" pitchFamily="49" charset="0"/>
+                        </a:rPr>
+                        <a:t>);</a:t>
+                      </a:r>
+                      <a:endParaRPr lang="en-DE" sz="1600">
+                        <a:latin typeface="Aptos Mono" panose="020B0009020202020204" pitchFamily="49" charset="0"/>
+                      </a:endParaRPr>
+                    </a:p>
+                  </a:txBody>
+                  <a:tcPr/>
+                </a:tc>
+                <a:extLst>
+                  <a:ext uri="{0D108BD9-81ED-4DB2-BD59-A6C34878D82A}">
+                    <a16:rowId xmlns:a16="http://schemas.microsoft.com/office/drawing/2014/main" val="2813245407"/>
+                  </a:ext>
+                </a:extLst>
+              </a:tr>
+              <a:tr h="427280">
+                <a:tc>
+                  <a:txBody>
+                    <a:bodyPr/>
+                    <a:lstStyle/>
+                    <a:p>
+                      <a:r>
+                        <a:rPr lang="en-US" sz="2000"/>
+                        <a:t>Leave everything as is (status quo)</a:t>
+                      </a:r>
+                      <a:endParaRPr lang="en-DE" sz="2000"/>
+                    </a:p>
+                  </a:txBody>
+                  <a:tcPr/>
+                </a:tc>
+                <a:tc>
+                  <a:txBody>
+                    <a:bodyPr/>
+                    <a:lstStyle/>
+                    <a:p>
+                      <a:pPr algn="ctr"/>
+                      <a:r>
+                        <a:rPr lang="en-DE"/>
+                        <a:t>❌</a:t>
+                      </a:r>
+                    </a:p>
+                  </a:txBody>
+                  <a:tcPr/>
+                </a:tc>
+                <a:tc>
+                  <a:txBody>
+                    <a:bodyPr/>
+                    <a:lstStyle/>
+                    <a:p>
+                      <a:pPr algn="ctr"/>
+                      <a:r>
+                        <a:rPr lang="en-DE"/>
+                        <a:t>❌</a:t>
+                      </a:r>
+                    </a:p>
+                  </a:txBody>
+                  <a:tcPr/>
+                </a:tc>
+                <a:tc>
+                  <a:txBody>
+                    <a:bodyPr/>
+                    <a:lstStyle/>
+                    <a:p>
+                      <a:pPr algn="ctr"/>
+                      <a:r>
+                        <a:rPr lang="en-DE"/>
+                        <a:t>❌</a:t>
+                      </a:r>
+                    </a:p>
+                  </a:txBody>
+                  <a:tcPr/>
+                </a:tc>
+                <a:extLst>
+                  <a:ext uri="{0D108BD9-81ED-4DB2-BD59-A6C34878D82A}">
+                    <a16:rowId xmlns:a16="http://schemas.microsoft.com/office/drawing/2014/main" val="1300373986"/>
+                  </a:ext>
+                </a:extLst>
+              </a:tr>
+              <a:tr h="427280">
+                <a:tc>
+                  <a:txBody>
+                    <a:bodyPr/>
+                    <a:lstStyle/>
+                    <a:p>
+                      <a:r>
+                        <a:rPr lang="en-US" sz="2000"/>
+                        <a:t>Exactly like list-initialization</a:t>
+                      </a:r>
+                      <a:endParaRPr lang="en-DE" sz="2000"/>
+                    </a:p>
+                  </a:txBody>
+                  <a:tcPr/>
+                </a:tc>
+                <a:tc>
+                  <a:txBody>
+                    <a:bodyPr/>
+                    <a:lstStyle/>
+                    <a:p>
+                      <a:pPr marL="0" marR="0" lvl="0" indent="0" algn="ctr" defTabSz="914400" rtl="0" eaLnBrk="1" fontAlgn="auto" latinLnBrk="0" hangingPunct="1">
+                        <a:lnSpc>
+                          <a:spcPct val="100000"/>
+                        </a:lnSpc>
+                        <a:spcBef>
+                          <a:spcPts val="0"/>
+                        </a:spcBef>
+                        <a:spcAft>
+                          <a:spcPts val="0"/>
+                        </a:spcAft>
+                        <a:buClrTx/>
+                        <a:buSzTx/>
+                        <a:buFontTx/>
+                        <a:buNone/>
+                        <a:tabLst/>
+                        <a:defRPr/>
+                      </a:pPr>
+                      <a:r>
+                        <a:rPr lang="en-DE"/>
+                        <a:t>✔️</a:t>
+                      </a:r>
+                    </a:p>
+                  </a:txBody>
+                  <a:tcPr/>
+                </a:tc>
+                <a:tc>
+                  <a:txBody>
+                    <a:bodyPr/>
+                    <a:lstStyle/>
+                    <a:p>
+                      <a:pPr algn="ctr"/>
+                      <a:r>
+                        <a:rPr lang="en-DE"/>
+                        <a:t>❌</a:t>
+                      </a:r>
+                    </a:p>
+                  </a:txBody>
+                  <a:tcPr/>
+                </a:tc>
+                <a:tc>
+                  <a:txBody>
+                    <a:bodyPr/>
+                    <a:lstStyle/>
+                    <a:p>
+                      <a:pPr algn="ctr"/>
+                      <a:r>
+                        <a:rPr lang="en-DE"/>
+                        <a:t>❌</a:t>
+                      </a:r>
+                    </a:p>
+                  </a:txBody>
+                  <a:tcPr/>
+                </a:tc>
+                <a:extLst>
+                  <a:ext uri="{0D108BD9-81ED-4DB2-BD59-A6C34878D82A}">
+                    <a16:rowId xmlns:a16="http://schemas.microsoft.com/office/drawing/2014/main" val="1180027158"/>
+                  </a:ext>
+                </a:extLst>
+              </a:tr>
+              <a:tr h="427280">
+                <a:tc>
+                  <a:txBody>
+                    <a:bodyPr/>
+                    <a:lstStyle/>
+                    <a:p>
+                      <a:r>
+                        <a:rPr lang="en-US" sz="2000"/>
+                        <a:t>Restrict non-integral conversions</a:t>
+                      </a:r>
+                      <a:endParaRPr lang="en-DE" sz="2000"/>
+                    </a:p>
+                  </a:txBody>
+                  <a:tcPr/>
+                </a:tc>
+                <a:tc>
+                  <a:txBody>
+                    <a:bodyPr/>
+                    <a:lstStyle/>
+                    <a:p>
+                      <a:pPr marL="0" marR="0" lvl="0" indent="0" algn="ctr" defTabSz="914400" rtl="0" eaLnBrk="1" fontAlgn="auto" latinLnBrk="0" hangingPunct="1">
+                        <a:lnSpc>
+                          <a:spcPct val="100000"/>
+                        </a:lnSpc>
+                        <a:spcBef>
+                          <a:spcPts val="0"/>
+                        </a:spcBef>
+                        <a:spcAft>
+                          <a:spcPts val="0"/>
+                        </a:spcAft>
+                        <a:buClrTx/>
+                        <a:buSzTx/>
+                        <a:buFontTx/>
+                        <a:buNone/>
+                        <a:tabLst/>
+                        <a:defRPr/>
+                      </a:pPr>
+                      <a:r>
+                        <a:rPr lang="en-DE"/>
+                        <a:t>✔️</a:t>
+                      </a:r>
+                    </a:p>
+                  </a:txBody>
+                  <a:tcPr/>
+                </a:tc>
+                <a:tc>
+                  <a:txBody>
+                    <a:bodyPr/>
+                    <a:lstStyle/>
+                    <a:p>
+                      <a:pPr marL="0" marR="0" lvl="0" indent="0" algn="ctr" defTabSz="914400" rtl="0" eaLnBrk="1" fontAlgn="auto" latinLnBrk="0" hangingPunct="1">
+                        <a:lnSpc>
+                          <a:spcPct val="100000"/>
+                        </a:lnSpc>
+                        <a:spcBef>
+                          <a:spcPts val="0"/>
+                        </a:spcBef>
+                        <a:spcAft>
+                          <a:spcPts val="0"/>
+                        </a:spcAft>
+                        <a:buClrTx/>
+                        <a:buSzTx/>
+                        <a:buFontTx/>
+                        <a:buNone/>
+                        <a:tabLst/>
+                        <a:defRPr/>
+                      </a:pPr>
+                      <a:r>
+                        <a:rPr lang="en-DE"/>
+                        <a:t>✔️</a:t>
+                      </a:r>
+                    </a:p>
+                  </a:txBody>
+                  <a:tcPr/>
+                </a:tc>
+                <a:tc>
+                  <a:txBody>
+                    <a:bodyPr/>
+                    <a:lstStyle/>
+                    <a:p>
+                      <a:pPr algn="ctr"/>
+                      <a:r>
+                        <a:rPr lang="en-DE"/>
+                        <a:t>❌</a:t>
+                      </a:r>
+                    </a:p>
+                  </a:txBody>
+                  <a:tcPr/>
+                </a:tc>
+                <a:extLst>
+                  <a:ext uri="{0D108BD9-81ED-4DB2-BD59-A6C34878D82A}">
+                    <a16:rowId xmlns:a16="http://schemas.microsoft.com/office/drawing/2014/main" val="170724866"/>
+                  </a:ext>
+                </a:extLst>
+              </a:tr>
+              <a:tr h="427280">
+                <a:tc>
+                  <a:txBody>
+                    <a:bodyPr/>
+                    <a:lstStyle/>
+                    <a:p>
+                      <a:r>
+                        <a:rPr lang="en-US" sz="2000"/>
+                        <a:t>Proposed (permissive)</a:t>
+                      </a:r>
+                      <a:endParaRPr lang="en-DE" sz="2000"/>
+                    </a:p>
+                  </a:txBody>
+                  <a:tcPr/>
+                </a:tc>
+                <a:tc>
+                  <a:txBody>
+                    <a:bodyPr/>
+                    <a:lstStyle/>
+                    <a:p>
+                      <a:pPr marL="0" marR="0" lvl="0" indent="0" algn="ctr" defTabSz="914400" rtl="0" eaLnBrk="1" fontAlgn="auto" latinLnBrk="0" hangingPunct="1">
+                        <a:lnSpc>
+                          <a:spcPct val="100000"/>
+                        </a:lnSpc>
+                        <a:spcBef>
+                          <a:spcPts val="0"/>
+                        </a:spcBef>
+                        <a:spcAft>
+                          <a:spcPts val="0"/>
+                        </a:spcAft>
+                        <a:buClrTx/>
+                        <a:buSzTx/>
+                        <a:buFontTx/>
+                        <a:buNone/>
+                        <a:tabLst/>
+                        <a:defRPr/>
+                      </a:pPr>
+                      <a:r>
+                        <a:rPr lang="en-DE"/>
+                        <a:t>✔️</a:t>
+                      </a:r>
+                    </a:p>
+                  </a:txBody>
+                  <a:tcPr/>
+                </a:tc>
+                <a:tc>
+                  <a:txBody>
+                    <a:bodyPr/>
+                    <a:lstStyle/>
+                    <a:p>
+                      <a:pPr marL="0" marR="0" lvl="0" indent="0" algn="ctr" defTabSz="914400" rtl="0" eaLnBrk="1" fontAlgn="auto" latinLnBrk="0" hangingPunct="1">
+                        <a:lnSpc>
+                          <a:spcPct val="100000"/>
+                        </a:lnSpc>
+                        <a:spcBef>
+                          <a:spcPts val="0"/>
+                        </a:spcBef>
+                        <a:spcAft>
+                          <a:spcPts val="0"/>
+                        </a:spcAft>
+                        <a:buClrTx/>
+                        <a:buSzTx/>
+                        <a:buFontTx/>
+                        <a:buNone/>
+                        <a:tabLst/>
+                        <a:defRPr/>
+                      </a:pPr>
+                      <a:r>
+                        <a:rPr lang="en-DE"/>
+                        <a:t>✔️</a:t>
+                      </a:r>
+                    </a:p>
+                  </a:txBody>
+                  <a:tcPr/>
+                </a:tc>
+                <a:tc>
+                  <a:txBody>
+                    <a:bodyPr/>
+                    <a:lstStyle/>
+                    <a:p>
+                      <a:pPr marL="0" marR="0" lvl="0" indent="0" algn="ctr" defTabSz="914400" rtl="0" eaLnBrk="1" fontAlgn="auto" latinLnBrk="0" hangingPunct="1">
+                        <a:lnSpc>
+                          <a:spcPct val="100000"/>
+                        </a:lnSpc>
+                        <a:spcBef>
+                          <a:spcPts val="0"/>
+                        </a:spcBef>
+                        <a:spcAft>
+                          <a:spcPts val="0"/>
+                        </a:spcAft>
+                        <a:buClrTx/>
+                        <a:buSzTx/>
+                        <a:buFontTx/>
+                        <a:buNone/>
+                        <a:tabLst/>
+                        <a:defRPr/>
+                      </a:pPr>
+                      <a:r>
+                        <a:rPr lang="en-DE"/>
+                        <a:t>✔️</a:t>
+                      </a:r>
+                    </a:p>
+                  </a:txBody>
+                  <a:tcPr/>
+                </a:tc>
+                <a:extLst>
+                  <a:ext uri="{0D108BD9-81ED-4DB2-BD59-A6C34878D82A}">
+                    <a16:rowId xmlns:a16="http://schemas.microsoft.com/office/drawing/2014/main" val="23369433"/>
+                  </a:ext>
+                </a:extLst>
+              </a:tr>
+            </a:tbl>
+          </a:graphicData>
+        </a:graphic>
+      </p:graphicFrame>
+    </p:spTree>
+    <p:extLst>
+      <p:ext uri="{BB962C8B-B14F-4D97-AF65-F5344CB8AC3E}">
+        <p14:creationId xmlns:p14="http://schemas.microsoft.com/office/powerpoint/2010/main" val="1991880358"/>
+      </p:ext>
+    </p:extLst>
+  </p:cSld>
+  <p:clrMapOvr>
+    <a:masterClrMapping/>
+  </p:clrMapOvr>
+</p:sld>
+</file>
+
+<file path=ppt/slides/slide8.xml><?xml version="1.0" encoding="utf-8"?>
+<p:sld xmlns:a="http://schemas.openxmlformats.org/drawingml/2006/main" xmlns:r="http://schemas.openxmlformats.org/officeDocument/2006/relationships" xmlns:p="http://schemas.openxmlformats.org/presentationml/2006/main">
+  <p:cSld>
+    <p:spTree>
+      <p:nvGrpSpPr>
+        <p:cNvPr id="1" name=""/>
+        <p:cNvGrpSpPr/>
+        <p:nvPr/>
+      </p:nvGrpSpPr>
+      <p:grpSpPr>
+        <a:xfrm>
+          <a:off x="0" y="0"/>
+          <a:ext cx="0" cy="0"/>
+          <a:chOff x="0" y="0"/>
+          <a:chExt cx="0" cy="0"/>
+        </a:xfrm>
+      </p:grpSpPr>
+      <p:sp>
+        <p:nvSpPr>
+          <p:cNvPr id="13" name="Rechteck 12">
+            <a:extLst>
+              <a:ext uri="{FF2B5EF4-FFF2-40B4-BE49-F238E27FC236}">
+                <a16:creationId xmlns:a16="http://schemas.microsoft.com/office/drawing/2014/main" id="{AB5CC674-D606-3406-C686-7E1E12531B6A}"/>
+              </a:ext>
+            </a:extLst>
+          </p:cNvPr>
+          <p:cNvSpPr/>
+          <p:nvPr/>
+        </p:nvSpPr>
+        <p:spPr>
+          <a:xfrm>
+            <a:off x="0" y="1"/>
+            <a:ext cx="12192000" cy="841428"/>
+          </a:xfrm>
+          <a:prstGeom prst="rect">
+            <a:avLst/>
+          </a:prstGeom>
+          <a:solidFill>
+            <a:schemeClr val="bg1">
+              <a:lumMod val="95000"/>
+            </a:schemeClr>
+          </a:solidFill>
+          <a:ln>
+            <a:noFill/>
+          </a:ln>
+        </p:spPr>
+        <p:style>
+          <a:lnRef idx="2">
+            <a:schemeClr val="accent1">
+              <a:shade val="15000"/>
+            </a:schemeClr>
+          </a:lnRef>
+          <a:fillRef idx="1">
+            <a:schemeClr val="accent1"/>
+          </a:fillRef>
+          <a:effectRef idx="0">
+            <a:schemeClr val="accent1"/>
+          </a:effectRef>
+          <a:fontRef idx="minor">
+            <a:schemeClr val="lt1"/>
+          </a:fontRef>
+        </p:style>
+        <p:txBody>
+          <a:bodyPr rtlCol="0" anchor="ctr"/>
+          <a:lstStyle/>
+          <a:p>
+            <a:pPr algn="ctr"/>
+            <a:endParaRPr lang="en-DE"/>
+          </a:p>
+        </p:txBody>
+      </p:sp>
+      <p:sp>
+        <p:nvSpPr>
+          <p:cNvPr id="4" name="Rechteck 3">
+            <a:extLst>
+              <a:ext uri="{FF2B5EF4-FFF2-40B4-BE49-F238E27FC236}">
+                <a16:creationId xmlns:a16="http://schemas.microsoft.com/office/drawing/2014/main" id="{F2F9FFB0-05D1-4434-BE8A-86794DC79A86}"/>
+              </a:ext>
+            </a:extLst>
+          </p:cNvPr>
+          <p:cNvSpPr/>
+          <p:nvPr/>
+        </p:nvSpPr>
+        <p:spPr>
+          <a:xfrm>
+            <a:off x="0" y="6172198"/>
+            <a:ext cx="12192000" cy="685801"/>
+          </a:xfrm>
+          <a:prstGeom prst="rect">
+            <a:avLst/>
+          </a:prstGeom>
+          <a:solidFill>
+            <a:schemeClr val="tx1"/>
+          </a:solidFill>
+          <a:ln>
+            <a:noFill/>
+          </a:ln>
+        </p:spPr>
+        <p:style>
+          <a:lnRef idx="2">
+            <a:schemeClr val="dk1">
+              <a:shade val="15000"/>
+            </a:schemeClr>
+          </a:lnRef>
+          <a:fillRef idx="1">
+            <a:schemeClr val="dk1"/>
+          </a:fillRef>
+          <a:effectRef idx="0">
+            <a:schemeClr val="dk1"/>
+          </a:effectRef>
+          <a:fontRef idx="minor">
+            <a:schemeClr val="lt1"/>
+          </a:fontRef>
+        </p:style>
+        <p:txBody>
+          <a:bodyPr rtlCol="0" anchor="ctr"/>
+          <a:lstStyle/>
+          <a:p>
+            <a:pPr algn="ctr"/>
+            <a:endParaRPr lang="en-DE"/>
+          </a:p>
+        </p:txBody>
+      </p:sp>
+      <p:sp>
+        <p:nvSpPr>
+          <p:cNvPr id="5" name="Rechteck 4">
+            <a:extLst>
+              <a:ext uri="{FF2B5EF4-FFF2-40B4-BE49-F238E27FC236}">
+                <a16:creationId xmlns:a16="http://schemas.microsoft.com/office/drawing/2014/main" id="{4C46F138-CA47-78A1-D6FB-E5AEAE7EAD3E}"/>
+              </a:ext>
+            </a:extLst>
+          </p:cNvPr>
+          <p:cNvSpPr/>
+          <p:nvPr/>
+        </p:nvSpPr>
+        <p:spPr>
+          <a:xfrm>
+            <a:off x="0" y="6088558"/>
+            <a:ext cx="12192000" cy="91920"/>
+          </a:xfrm>
+          <a:prstGeom prst="rect">
+            <a:avLst/>
+          </a:prstGeom>
+          <a:solidFill>
+            <a:srgbClr val="FABCCF"/>
+          </a:solidFill>
+          <a:ln>
+            <a:noFill/>
+          </a:ln>
+        </p:spPr>
+        <p:style>
+          <a:lnRef idx="2">
+            <a:schemeClr val="dk1">
+              <a:shade val="15000"/>
+            </a:schemeClr>
+          </a:lnRef>
+          <a:fillRef idx="1">
+            <a:schemeClr val="dk1"/>
+          </a:fillRef>
+          <a:effectRef idx="0">
+            <a:schemeClr val="dk1"/>
+          </a:effectRef>
+          <a:fontRef idx="minor">
+            <a:schemeClr val="lt1"/>
+          </a:fontRef>
+        </p:style>
+        <p:txBody>
+          <a:bodyPr rtlCol="0" anchor="ctr"/>
+          <a:lstStyle/>
+          <a:p>
+            <a:pPr algn="ctr"/>
+            <a:endParaRPr lang="en-DE"/>
+          </a:p>
+        </p:txBody>
+      </p:sp>
+      <p:sp>
+        <p:nvSpPr>
+          <p:cNvPr id="6" name="Rechteck 5">
+            <a:extLst>
+              <a:ext uri="{FF2B5EF4-FFF2-40B4-BE49-F238E27FC236}">
+                <a16:creationId xmlns:a16="http://schemas.microsoft.com/office/drawing/2014/main" id="{D6DF6F79-9702-1B2D-B337-C13368EDAE95}"/>
+              </a:ext>
+            </a:extLst>
+          </p:cNvPr>
+          <p:cNvSpPr/>
+          <p:nvPr/>
+        </p:nvSpPr>
+        <p:spPr>
+          <a:xfrm>
+            <a:off x="0" y="5927168"/>
+            <a:ext cx="12192000" cy="159518"/>
+          </a:xfrm>
+          <a:prstGeom prst="rect">
+            <a:avLst/>
+          </a:prstGeom>
+          <a:solidFill>
+            <a:schemeClr val="bg1">
+              <a:lumMod val="95000"/>
+            </a:schemeClr>
+          </a:solidFill>
+          <a:ln>
+            <a:noFill/>
+          </a:ln>
+        </p:spPr>
+        <p:style>
+          <a:lnRef idx="2">
+            <a:schemeClr val="dk1">
+              <a:shade val="15000"/>
+            </a:schemeClr>
+          </a:lnRef>
+          <a:fillRef idx="1">
+            <a:schemeClr val="dk1"/>
+          </a:fillRef>
+          <a:effectRef idx="0">
+            <a:schemeClr val="dk1"/>
+          </a:effectRef>
+          <a:fontRef idx="minor">
+            <a:schemeClr val="lt1"/>
+          </a:fontRef>
+        </p:style>
+        <p:txBody>
+          <a:bodyPr rtlCol="0" anchor="ctr"/>
+          <a:lstStyle/>
+          <a:p>
+            <a:pPr algn="ctr"/>
+            <a:endParaRPr lang="en-DE"/>
+          </a:p>
+        </p:txBody>
+      </p:sp>
+      <p:sp>
+        <p:nvSpPr>
+          <p:cNvPr id="8" name="Textfeld 7">
+            <a:extLst>
+              <a:ext uri="{FF2B5EF4-FFF2-40B4-BE49-F238E27FC236}">
+                <a16:creationId xmlns:a16="http://schemas.microsoft.com/office/drawing/2014/main" id="{2687DB21-E114-1E4F-29AB-B2D599072FFF}"/>
+              </a:ext>
+            </a:extLst>
+          </p:cNvPr>
+          <p:cNvSpPr txBox="1"/>
+          <p:nvPr/>
+        </p:nvSpPr>
+        <p:spPr>
+          <a:xfrm>
+            <a:off x="10835014" y="6180478"/>
+            <a:ext cx="1356986" cy="769441"/>
+          </a:xfrm>
+          <a:prstGeom prst="rect">
+            <a:avLst/>
+          </a:prstGeom>
+          <a:noFill/>
+        </p:spPr>
+        <p:txBody>
+          <a:bodyPr wrap="square" anchor="ctr" anchorCtr="0">
+            <a:spAutoFit/>
+          </a:bodyPr>
+          <a:lstStyle/>
+          <a:p>
+            <a:pPr algn="r"/>
+            <a:r>
+              <a:rPr lang="ja-JP" altLang="en-US" sz="4400" b="1">
+                <a:solidFill>
+                  <a:srgbClr val="FABCCF"/>
+                </a:solidFill>
+              </a:rPr>
+              <a:t>東京</a:t>
+            </a:r>
+            <a:endParaRPr lang="en-DE" sz="4400" b="1">
+              <a:solidFill>
+                <a:srgbClr val="FABCCF"/>
+              </a:solidFill>
+            </a:endParaRPr>
+          </a:p>
+        </p:txBody>
+      </p:sp>
+      <p:sp>
+        <p:nvSpPr>
+          <p:cNvPr id="10" name="Textfeld 9">
+            <a:extLst>
+              <a:ext uri="{FF2B5EF4-FFF2-40B4-BE49-F238E27FC236}">
+                <a16:creationId xmlns:a16="http://schemas.microsoft.com/office/drawing/2014/main" id="{8A77F318-31B1-26EF-32FC-6C3A9FF3EE2F}"/>
+              </a:ext>
+            </a:extLst>
+          </p:cNvPr>
+          <p:cNvSpPr txBox="1"/>
+          <p:nvPr/>
+        </p:nvSpPr>
+        <p:spPr>
+          <a:xfrm>
+            <a:off x="9602648" y="6283492"/>
+            <a:ext cx="1453018" cy="523220"/>
+          </a:xfrm>
+          <a:prstGeom prst="rect">
+            <a:avLst/>
+          </a:prstGeom>
+          <a:noFill/>
+        </p:spPr>
+        <p:txBody>
+          <a:bodyPr wrap="square">
+            <a:spAutoFit/>
+          </a:bodyPr>
+          <a:lstStyle/>
+          <a:p>
+            <a:pPr algn="r"/>
+            <a:r>
+              <a:rPr lang="de-DE" altLang="ja-JP" sz="2800" b="1">
+                <a:solidFill>
+                  <a:srgbClr val="FABCCF"/>
+                </a:solidFill>
+              </a:rPr>
+              <a:t>2024</a:t>
+            </a:r>
+            <a:endParaRPr lang="en-DE" sz="2800"/>
+          </a:p>
+        </p:txBody>
+      </p:sp>
+      <p:sp>
+        <p:nvSpPr>
+          <p:cNvPr id="11" name="Foliennummernplatzhalter 10">
+            <a:extLst>
+              <a:ext uri="{FF2B5EF4-FFF2-40B4-BE49-F238E27FC236}">
+                <a16:creationId xmlns:a16="http://schemas.microsoft.com/office/drawing/2014/main" id="{D4706ECE-D040-7093-5E5E-CA78FAA6D2CB}"/>
+              </a:ext>
+            </a:extLst>
+          </p:cNvPr>
+          <p:cNvSpPr>
+            <a:spLocks noGrp="1"/>
+          </p:cNvSpPr>
+          <p:nvPr>
+            <p:ph type="sldNum" sz="quarter" idx="12"/>
+          </p:nvPr>
+        </p:nvSpPr>
+        <p:spPr>
+          <a:xfrm>
+            <a:off x="90434" y="6331718"/>
+            <a:ext cx="411145" cy="365125"/>
+          </a:xfrm>
+        </p:spPr>
+        <p:txBody>
+          <a:bodyPr/>
+          <a:lstStyle/>
+          <a:p>
+            <a:fld id="{4E013C7D-59EF-4845-9E34-76F90254E037}" type="slidenum">
+              <a:rPr lang="en-DE" sz="2800" b="1" smtClean="0">
+                <a:solidFill>
+                  <a:schemeClr val="bg1"/>
+                </a:solidFill>
+              </a:rPr>
+              <a:t>7</a:t>
             </a:fld>
             <a:endParaRPr lang="en-DE" sz="2800" b="1">
               <a:solidFill>

</xml_diff>